<commit_message>
TM expert response collect
</commit_message>
<xml_diff>
--- a/03-30cow_GS_label_expert_response/plots/plot_edit.pptx
+++ b/03-30cow_GS_label_expert_response/plots/plot_edit.pptx
@@ -115,7 +115,7 @@
 <file path=ppt/revisionInfo.xml><?xml version="1.0" encoding="utf-8"?>
 <p1510:revInfo xmlns:a="http://schemas.openxmlformats.org/drawingml/2006/main" xmlns:r="http://schemas.openxmlformats.org/officeDocument/2006/relationships" xmlns:p1510="http://schemas.microsoft.com/office/powerpoint/2015/10/main">
   <p1510:revLst>
-    <p1510:client id="{B2D151C4-1F17-AF40-8C4F-99B319E054BB}" v="3" dt="2023-09-29T22:35:04.821"/>
+    <p1510:client id="{CE249BA8-4221-FE48-8BF5-B1A36F7EF005}" v="2" dt="2023-10-20T08:50:31.730"/>
   </p1510:revLst>
 </p1510:revInfo>
 </file>
@@ -170,6 +170,46 @@
       </pc:sldChg>
     </pc:docChg>
   </pc:docChgLst>
+  <pc:docChgLst>
+    <pc:chgData name="skysheng@student.ubc.ca" userId="151a379e-f285-4a68-a37b-1bca06721c93" providerId="ADAL" clId="{CE249BA8-4221-FE48-8BF5-B1A36F7EF005}"/>
+    <pc:docChg chg="custSel modSld">
+      <pc:chgData name="skysheng@student.ubc.ca" userId="151a379e-f285-4a68-a37b-1bca06721c93" providerId="ADAL" clId="{CE249BA8-4221-FE48-8BF5-B1A36F7EF005}" dt="2023-10-20T08:51:44.845" v="23" actId="1035"/>
+      <pc:docMkLst>
+        <pc:docMk/>
+      </pc:docMkLst>
+      <pc:sldChg chg="addSp delSp modSp mod">
+        <pc:chgData name="skysheng@student.ubc.ca" userId="151a379e-f285-4a68-a37b-1bca06721c93" providerId="ADAL" clId="{CE249BA8-4221-FE48-8BF5-B1A36F7EF005}" dt="2023-10-20T08:51:44.845" v="23" actId="1035"/>
+        <pc:sldMkLst>
+          <pc:docMk/>
+          <pc:sldMk cId="891044414" sldId="256"/>
+        </pc:sldMkLst>
+        <pc:picChg chg="del">
+          <ac:chgData name="skysheng@student.ubc.ca" userId="151a379e-f285-4a68-a37b-1bca06721c93" providerId="ADAL" clId="{CE249BA8-4221-FE48-8BF5-B1A36F7EF005}" dt="2023-10-20T08:50:06.624" v="0" actId="478"/>
+          <ac:picMkLst>
+            <pc:docMk/>
+            <pc:sldMk cId="891044414" sldId="256"/>
+            <ac:picMk id="3" creationId="{ABA3BE39-C3FB-2909-5975-5336FE274752}"/>
+          </ac:picMkLst>
+        </pc:picChg>
+        <pc:picChg chg="add mod">
+          <ac:chgData name="skysheng@student.ubc.ca" userId="151a379e-f285-4a68-a37b-1bca06721c93" providerId="ADAL" clId="{CE249BA8-4221-FE48-8BF5-B1A36F7EF005}" dt="2023-10-20T08:51:44.845" v="23" actId="1035"/>
+          <ac:picMkLst>
+            <pc:docMk/>
+            <pc:sldMk cId="891044414" sldId="256"/>
+            <ac:picMk id="4" creationId="{430C163D-2B71-1C61-CAD9-DE5615419B8A}"/>
+          </ac:picMkLst>
+        </pc:picChg>
+        <pc:picChg chg="mod">
+          <ac:chgData name="skysheng@student.ubc.ca" userId="151a379e-f285-4a68-a37b-1bca06721c93" providerId="ADAL" clId="{CE249BA8-4221-FE48-8BF5-B1A36F7EF005}" dt="2023-10-20T08:51:35.953" v="18" actId="14100"/>
+          <ac:picMkLst>
+            <pc:docMk/>
+            <pc:sldMk cId="891044414" sldId="256"/>
+            <ac:picMk id="14" creationId="{C0EEB8CA-3A70-FBB3-2D96-1319D2285685}"/>
+          </ac:picMkLst>
+        </pc:picChg>
+      </pc:sldChg>
+    </pc:docChg>
+  </pc:docChgLst>
 </pc:chgInfo>
 </file>
 
@@ -320,7 +360,7 @@
           <a:p>
             <a:fld id="{BB5A897F-1B31-8344-A2FA-B99B8B2FB3D3}" type="datetimeFigureOut">
               <a:rPr lang="en-US" smtClean="0"/>
-              <a:t>9/29/23</a:t>
+              <a:t>10/20/23</a:t>
             </a:fld>
             <a:endParaRPr lang="en-US"/>
           </a:p>
@@ -518,7 +558,7 @@
           <a:p>
             <a:fld id="{BB5A897F-1B31-8344-A2FA-B99B8B2FB3D3}" type="datetimeFigureOut">
               <a:rPr lang="en-US" smtClean="0"/>
-              <a:t>9/29/23</a:t>
+              <a:t>10/20/23</a:t>
             </a:fld>
             <a:endParaRPr lang="en-US"/>
           </a:p>
@@ -726,7 +766,7 @@
           <a:p>
             <a:fld id="{BB5A897F-1B31-8344-A2FA-B99B8B2FB3D3}" type="datetimeFigureOut">
               <a:rPr lang="en-US" smtClean="0"/>
-              <a:t>9/29/23</a:t>
+              <a:t>10/20/23</a:t>
             </a:fld>
             <a:endParaRPr lang="en-US"/>
           </a:p>
@@ -924,7 +964,7 @@
           <a:p>
             <a:fld id="{BB5A897F-1B31-8344-A2FA-B99B8B2FB3D3}" type="datetimeFigureOut">
               <a:rPr lang="en-US" smtClean="0"/>
-              <a:t>9/29/23</a:t>
+              <a:t>10/20/23</a:t>
             </a:fld>
             <a:endParaRPr lang="en-US"/>
           </a:p>
@@ -1199,7 +1239,7 @@
           <a:p>
             <a:fld id="{BB5A897F-1B31-8344-A2FA-B99B8B2FB3D3}" type="datetimeFigureOut">
               <a:rPr lang="en-US" smtClean="0"/>
-              <a:t>9/29/23</a:t>
+              <a:t>10/20/23</a:t>
             </a:fld>
             <a:endParaRPr lang="en-US"/>
           </a:p>
@@ -1464,7 +1504,7 @@
           <a:p>
             <a:fld id="{BB5A897F-1B31-8344-A2FA-B99B8B2FB3D3}" type="datetimeFigureOut">
               <a:rPr lang="en-US" smtClean="0"/>
-              <a:t>9/29/23</a:t>
+              <a:t>10/20/23</a:t>
             </a:fld>
             <a:endParaRPr lang="en-US"/>
           </a:p>
@@ -1876,7 +1916,7 @@
           <a:p>
             <a:fld id="{BB5A897F-1B31-8344-A2FA-B99B8B2FB3D3}" type="datetimeFigureOut">
               <a:rPr lang="en-US" smtClean="0"/>
-              <a:t>9/29/23</a:t>
+              <a:t>10/20/23</a:t>
             </a:fld>
             <a:endParaRPr lang="en-US"/>
           </a:p>
@@ -2017,7 +2057,7 @@
           <a:p>
             <a:fld id="{BB5A897F-1B31-8344-A2FA-B99B8B2FB3D3}" type="datetimeFigureOut">
               <a:rPr lang="en-US" smtClean="0"/>
-              <a:t>9/29/23</a:t>
+              <a:t>10/20/23</a:t>
             </a:fld>
             <a:endParaRPr lang="en-US"/>
           </a:p>
@@ -2130,7 +2170,7 @@
           <a:p>
             <a:fld id="{BB5A897F-1B31-8344-A2FA-B99B8B2FB3D3}" type="datetimeFigureOut">
               <a:rPr lang="en-US" smtClean="0"/>
-              <a:t>9/29/23</a:t>
+              <a:t>10/20/23</a:t>
             </a:fld>
             <a:endParaRPr lang="en-US"/>
           </a:p>
@@ -2441,7 +2481,7 @@
           <a:p>
             <a:fld id="{BB5A897F-1B31-8344-A2FA-B99B8B2FB3D3}" type="datetimeFigureOut">
               <a:rPr lang="en-US" smtClean="0"/>
-              <a:t>9/29/23</a:t>
+              <a:t>10/20/23</a:t>
             </a:fld>
             <a:endParaRPr lang="en-US"/>
           </a:p>
@@ -2729,7 +2769,7 @@
           <a:p>
             <a:fld id="{BB5A897F-1B31-8344-A2FA-B99B8B2FB3D3}" type="datetimeFigureOut">
               <a:rPr lang="en-US" smtClean="0"/>
-              <a:t>9/29/23</a:t>
+              <a:t>10/20/23</a:t>
             </a:fld>
             <a:endParaRPr lang="en-US"/>
           </a:p>
@@ -2970,7 +3010,7 @@
           <a:p>
             <a:fld id="{BB5A897F-1B31-8344-A2FA-B99B8B2FB3D3}" type="datetimeFigureOut">
               <a:rPr lang="en-US" smtClean="0"/>
-              <a:t>9/29/23</a:t>
+              <a:t>10/20/23</a:t>
             </a:fld>
             <a:endParaRPr lang="en-US"/>
           </a:p>
@@ -3389,10 +3429,10 @@
       </p:grpSpPr>
       <p:pic>
         <p:nvPicPr>
-          <p:cNvPr id="3" name="Picture 2" descr="A graph with numbers and circles&#10;&#10;Description automatically generated">
-            <a:extLst>
-              <a:ext uri="{FF2B5EF4-FFF2-40B4-BE49-F238E27FC236}">
-                <a16:creationId xmlns:a16="http://schemas.microsoft.com/office/drawing/2014/main" id="{ABA3BE39-C3FB-2909-5975-5336FE274752}"/>
+          <p:cNvPr id="4" name="Picture 3" descr="A graph with numbers and circles&#10;&#10;Description automatically generated">
+            <a:extLst>
+              <a:ext uri="{FF2B5EF4-FFF2-40B4-BE49-F238E27FC236}">
+                <a16:creationId xmlns:a16="http://schemas.microsoft.com/office/drawing/2014/main" id="{430C163D-2B71-1C61-CAD9-DE5615419B8A}"/>
               </a:ext>
             </a:extLst>
           </p:cNvPr>
@@ -3409,7 +3449,7 @@
         </p:blipFill>
         <p:spPr>
           <a:xfrm>
-            <a:off x="2139461" y="0"/>
+            <a:off x="2273273" y="-22302"/>
             <a:ext cx="7772400" cy="6736079"/>
           </a:xfrm>
           <a:prstGeom prst="rect">
@@ -3562,8 +3602,8 @@
         </p:blipFill>
         <p:spPr>
           <a:xfrm>
-            <a:off x="3254649" y="5742858"/>
-            <a:ext cx="215899" cy="324294"/>
+            <a:off x="3269755" y="5765548"/>
+            <a:ext cx="200793" cy="301604"/>
           </a:xfrm>
           <a:prstGeom prst="rect">
             <a:avLst/>

</xml_diff>